<commit_message>
balls collisions in WPF
</commit_message>
<xml_diff>
--- a/wpf-ball-to-ball-collision/media/diagrams.pptx
+++ b/wpf-ball-to-ball-collision/media/diagrams.pptx
@@ -256,7 +256,7 @@
           <a:p>
             <a:fld id="{F740ED6E-2DD7-4228-9745-F887DF8E8C38}" type="datetimeFigureOut">
               <a:rPr lang="en-US" smtClean="0"/>
-              <a:t>8/13/2023</a:t>
+              <a:t>8/14/2023</a:t>
             </a:fld>
             <a:endParaRPr lang="en-US"/>
           </a:p>
@@ -424,7 +424,7 @@
           <a:p>
             <a:fld id="{F740ED6E-2DD7-4228-9745-F887DF8E8C38}" type="datetimeFigureOut">
               <a:rPr lang="en-US" smtClean="0"/>
-              <a:t>8/13/2023</a:t>
+              <a:t>8/14/2023</a:t>
             </a:fld>
             <a:endParaRPr lang="en-US"/>
           </a:p>
@@ -602,7 +602,7 @@
           <a:p>
             <a:fld id="{F740ED6E-2DD7-4228-9745-F887DF8E8C38}" type="datetimeFigureOut">
               <a:rPr lang="en-US" smtClean="0"/>
-              <a:t>8/13/2023</a:t>
+              <a:t>8/14/2023</a:t>
             </a:fld>
             <a:endParaRPr lang="en-US"/>
           </a:p>
@@ -770,7 +770,7 @@
           <a:p>
             <a:fld id="{F740ED6E-2DD7-4228-9745-F887DF8E8C38}" type="datetimeFigureOut">
               <a:rPr lang="en-US" smtClean="0"/>
-              <a:t>8/13/2023</a:t>
+              <a:t>8/14/2023</a:t>
             </a:fld>
             <a:endParaRPr lang="en-US"/>
           </a:p>
@@ -1015,7 +1015,7 @@
           <a:p>
             <a:fld id="{F740ED6E-2DD7-4228-9745-F887DF8E8C38}" type="datetimeFigureOut">
               <a:rPr lang="en-US" smtClean="0"/>
-              <a:t>8/13/2023</a:t>
+              <a:t>8/14/2023</a:t>
             </a:fld>
             <a:endParaRPr lang="en-US"/>
           </a:p>
@@ -1244,7 +1244,7 @@
           <a:p>
             <a:fld id="{F740ED6E-2DD7-4228-9745-F887DF8E8C38}" type="datetimeFigureOut">
               <a:rPr lang="en-US" smtClean="0"/>
-              <a:t>8/13/2023</a:t>
+              <a:t>8/14/2023</a:t>
             </a:fld>
             <a:endParaRPr lang="en-US"/>
           </a:p>
@@ -1608,7 +1608,7 @@
           <a:p>
             <a:fld id="{F740ED6E-2DD7-4228-9745-F887DF8E8C38}" type="datetimeFigureOut">
               <a:rPr lang="en-US" smtClean="0"/>
-              <a:t>8/13/2023</a:t>
+              <a:t>8/14/2023</a:t>
             </a:fld>
             <a:endParaRPr lang="en-US"/>
           </a:p>
@@ -1725,7 +1725,7 @@
           <a:p>
             <a:fld id="{F740ED6E-2DD7-4228-9745-F887DF8E8C38}" type="datetimeFigureOut">
               <a:rPr lang="en-US" smtClean="0"/>
-              <a:t>8/13/2023</a:t>
+              <a:t>8/14/2023</a:t>
             </a:fld>
             <a:endParaRPr lang="en-US"/>
           </a:p>
@@ -1820,7 +1820,7 @@
           <a:p>
             <a:fld id="{F740ED6E-2DD7-4228-9745-F887DF8E8C38}" type="datetimeFigureOut">
               <a:rPr lang="en-US" smtClean="0"/>
-              <a:t>8/13/2023</a:t>
+              <a:t>8/14/2023</a:t>
             </a:fld>
             <a:endParaRPr lang="en-US"/>
           </a:p>
@@ -2095,7 +2095,7 @@
           <a:p>
             <a:fld id="{F740ED6E-2DD7-4228-9745-F887DF8E8C38}" type="datetimeFigureOut">
               <a:rPr lang="en-US" smtClean="0"/>
-              <a:t>8/13/2023</a:t>
+              <a:t>8/14/2023</a:t>
             </a:fld>
             <a:endParaRPr lang="en-US"/>
           </a:p>
@@ -2347,7 +2347,7 @@
           <a:p>
             <a:fld id="{F740ED6E-2DD7-4228-9745-F887DF8E8C38}" type="datetimeFigureOut">
               <a:rPr lang="en-US" smtClean="0"/>
-              <a:t>8/13/2023</a:t>
+              <a:t>8/14/2023</a:t>
             </a:fld>
             <a:endParaRPr lang="en-US"/>
           </a:p>
@@ -2558,7 +2558,7 @@
           <a:p>
             <a:fld id="{F740ED6E-2DD7-4228-9745-F887DF8E8C38}" type="datetimeFigureOut">
               <a:rPr lang="en-US" smtClean="0"/>
-              <a:t>8/13/2023</a:t>
+              <a:t>8/14/2023</a:t>
             </a:fld>
             <a:endParaRPr lang="en-US"/>
           </a:p>
@@ -13679,7 +13679,7 @@
         <p:spPr>
           <a:xfrm>
             <a:off x="3769656" y="2111457"/>
-            <a:ext cx="410690" cy="369332"/>
+            <a:ext cx="372218" cy="369332"/>
           </a:xfrm>
           <a:prstGeom prst="rect">
             <a:avLst/>
@@ -13698,13 +13698,16 @@
                   <a:srgbClr val="FF0000"/>
                 </a:solidFill>
               </a:rPr>
-              <a:t>v1</a:t>
-            </a:r>
-            <a:endParaRPr lang="en-US" b="1" baseline="-25000" dirty="0">
-              <a:solidFill>
-                <a:srgbClr val="FF0000"/>
-              </a:solidFill>
-            </a:endParaRPr>
+              <a:t>v</a:t>
+            </a:r>
+            <a:r>
+              <a:rPr lang="en-US" b="1" baseline="-25000" dirty="0">
+                <a:solidFill>
+                  <a:srgbClr val="FF0000"/>
+                </a:solidFill>
+              </a:rPr>
+              <a:t>1</a:t>
+            </a:r>
           </a:p>
         </p:txBody>
       </p:sp>
@@ -14340,7 +14343,7 @@
         <p:spPr>
           <a:xfrm>
             <a:off x="2641484" y="2458261"/>
-            <a:ext cx="1333517" cy="22528"/>
+            <a:ext cx="1314281" cy="22528"/>
           </a:xfrm>
           <a:prstGeom prst="line">
             <a:avLst/>
@@ -15569,7 +15572,7 @@
         </p:nvCxnSpPr>
         <p:spPr>
           <a:xfrm flipH="1" flipV="1">
-            <a:off x="2701711" y="3263309"/>
+            <a:off x="2740150" y="3288992"/>
             <a:ext cx="1315697" cy="740617"/>
           </a:xfrm>
           <a:prstGeom prst="straightConnector1">

</xml_diff>